<commit_message>
slightly lower in ablation zone
</commit_message>
<xml_diff>
--- a/presentatie/presentatie_maio_v3.pptx
+++ b/presentatie/presentatie_maio_v3.pptx
@@ -7501,7 +7501,7 @@
             </a:r>
             <a:r>
               <a:rPr lang="nl-NL" dirty="0" err="1"/>
-              <a:t>somewhat</a:t>
+              <a:t>slighly</a:t>
             </a:r>
             <a:r>
               <a:rPr lang="nl-NL" dirty="0"/>
@@ -7513,7 +7513,15 @@
             </a:r>
             <a:r>
               <a:rPr lang="nl-NL" dirty="0"/>
-              <a:t>) </a:t>
+              <a:t> in </a:t>
+            </a:r>
+            <a:r>
+              <a:rPr lang="nl-NL" dirty="0" err="1"/>
+              <a:t>ablation</a:t>
+            </a:r>
+            <a:r>
+              <a:rPr lang="nl-NL" dirty="0"/>
+              <a:t> zone) </a:t>
             </a:r>
             <a:r>
               <a:rPr lang="nl-NL" dirty="0" err="1"/>

</xml_diff>